<commit_message>
time chart size fix
</commit_message>
<xml_diff>
--- a/v1.pptx
+++ b/v1.pptx
@@ -138,6 +138,22 @@
       </a:defRPr>
     </a:lvl9pPr>
   </p:defaultTextStyle>
+  <p:extLst>
+    <p:ext uri="{EFAFB233-063F-42B5-8137-9DF3F51BA10A}">
+      <p15:sldGuideLst xmlns:p15="http://schemas.microsoft.com/office/powerpoint/2012/main">
+        <p15:guide id="1" orient="horz" pos="2160">
+          <p15:clr>
+            <a:srgbClr val="A4A3A4"/>
+          </p15:clr>
+        </p15:guide>
+        <p15:guide id="2" pos="3840">
+          <p15:clr>
+            <a:srgbClr val="A4A3A4"/>
+          </p15:clr>
+        </p15:guide>
+      </p15:sldGuideLst>
+    </p:ext>
+  </p:extLst>
 </p:presentation>
 </file>
 
@@ -3348,7 +3364,7 @@
         <p:spPr>
           <a:xfrm>
             <a:off x="1120459" y="1893193"/>
-            <a:ext cx="2369713" cy="2585323"/>
+            <a:ext cx="2369713" cy="2308324"/>
           </a:xfrm>
           <a:prstGeom prst="rect">
             <a:avLst/>
@@ -3393,7 +3409,11 @@
             </a:pPr>
             <a:r>
               <a:rPr lang="en-US" dirty="0" smtClean="0"/>
-              <a:t>Crime Number in One area </a:t>
+              <a:t>Crime </a:t>
+            </a:r>
+            <a:r>
+              <a:rPr lang="en-US" dirty="0" smtClean="0"/>
+              <a:t>Number</a:t>
             </a:r>
           </a:p>
           <a:p>
@@ -3403,7 +3423,11 @@
             </a:pPr>
             <a:r>
               <a:rPr lang="en-US" dirty="0" smtClean="0"/>
-              <a:t>Review Count of All Restaurants in one area </a:t>
+              <a:t>Review </a:t>
+            </a:r>
+            <a:r>
+              <a:rPr lang="en-US" dirty="0" smtClean="0"/>
+              <a:t>Count of All Restaurants in one area </a:t>
             </a:r>
             <a:endParaRPr lang="en-US" dirty="0"/>
           </a:p>
@@ -3768,7 +3792,19 @@
           <a:p>
             <a:r>
               <a:rPr lang="en-US" sz="2000" dirty="0" smtClean="0"/>
-              <a:t>The slide bar will allow user to select a time range between 2012 and 2013.</a:t>
+              <a:t>The slide bar will allow user to select a time range between </a:t>
+            </a:r>
+            <a:r>
+              <a:rPr lang="en-US" sz="2000" dirty="0" smtClean="0"/>
+              <a:t>year </a:t>
+            </a:r>
+            <a:r>
+              <a:rPr lang="en-US" sz="2000" dirty="0" smtClean="0"/>
+              <a:t>2012 </a:t>
+            </a:r>
+            <a:r>
+              <a:rPr lang="en-US" sz="2000" dirty="0" smtClean="0"/>
+              <a:t>and 2013.</a:t>
             </a:r>
           </a:p>
           <a:p>
@@ -4131,7 +4167,19 @@
             </a:pPr>
             <a:r>
               <a:rPr lang="en-US" dirty="0" smtClean="0"/>
-              <a:t>One problem we encounter is when the selected time range is very small (e.g. 1 month),  the original intervals do not work very well anymore.</a:t>
+              <a:t>One problem we encounter is when the selected time range is very small (e.g. 1 month),  the original intervals </a:t>
+            </a:r>
+            <a:r>
+              <a:rPr lang="en-US" dirty="0" smtClean="0"/>
+              <a:t>will</a:t>
+            </a:r>
+            <a:r>
+              <a:rPr lang="en-US" dirty="0" smtClean="0"/>
+              <a:t> </a:t>
+            </a:r>
+            <a:r>
+              <a:rPr lang="en-US" dirty="0" smtClean="0"/>
+              <a:t>not work very well anymore.</a:t>
             </a:r>
           </a:p>
           <a:p>
@@ -4741,25 +4789,7 @@
               <a:srgbClr val="FFFFFF"/>
             </a:contourClr>
           </a:sp3d>
-          <a:extLst>
-            <a:ext uri="{909E8E84-426E-40DD-AFC4-6F175D3DCCD1}">
-              <a14:hiddenFill xmlns:a14="http://schemas.microsoft.com/office/drawing/2010/main">
-                <a:solidFill>
-                  <a:schemeClr val="accent1"/>
-                </a:solidFill>
-              </a14:hiddenFill>
-            </a:ext>
-            <a:ext uri="{91240B29-F687-4F45-9708-019B960494DF}">
-              <a14:hiddenLine xmlns:a14="http://schemas.microsoft.com/office/drawing/2010/main" w="9525">
-                <a:solidFill>
-                  <a:schemeClr val="tx1"/>
-                </a:solidFill>
-                <a:miter lim="800000"/>
-                <a:headEnd/>
-                <a:tailEnd/>
-              </a14:hiddenLine>
-            </a:ext>
-          </a:extLst>
+          <a:extLst/>
         </p:spPr>
       </p:pic>
       <p:pic>
@@ -5674,7 +5704,7 @@
         </p:blipFill>
         <p:spPr bwMode="auto">
           <a:xfrm>
-            <a:off x="1161619" y="4037733"/>
+            <a:off x="1161619" y="4150887"/>
             <a:ext cx="5629275" cy="1885950"/>
           </a:xfrm>
           <a:prstGeom prst="rect">
@@ -5753,7 +5783,39 @@
             </a:pPr>
             <a:r>
               <a:rPr lang="en-US" dirty="0" smtClean="0"/>
-              <a:t>x-axis will always have 20 sample points within the selected time range, but interval between each time stamp will change dynamically, the value in each time stamp is the average over that interval.</a:t>
+              <a:t>x-axis will always have 20 sample points within the selected time range, but </a:t>
+            </a:r>
+            <a:r>
+              <a:rPr lang="en-US" dirty="0" smtClean="0"/>
+              <a:t>the interval </a:t>
+            </a:r>
+            <a:r>
+              <a:rPr lang="en-US" dirty="0" smtClean="0"/>
+              <a:t>between each </a:t>
+            </a:r>
+            <a:r>
+              <a:rPr lang="en-US" dirty="0" smtClean="0"/>
+              <a:t>sample point will </a:t>
+            </a:r>
+            <a:r>
+              <a:rPr lang="en-US" dirty="0" smtClean="0"/>
+              <a:t>change dynamically, the value in each </a:t>
+            </a:r>
+            <a:r>
+              <a:rPr lang="en-US" dirty="0" smtClean="0"/>
+              <a:t>sample point </a:t>
+            </a:r>
+            <a:r>
+              <a:rPr lang="en-US" dirty="0" smtClean="0"/>
+              <a:t>is the </a:t>
+            </a:r>
+            <a:r>
+              <a:rPr lang="en-US" dirty="0" smtClean="0"/>
+              <a:t>average of data </a:t>
+            </a:r>
+            <a:r>
+              <a:rPr lang="en-US" dirty="0" smtClean="0"/>
+              <a:t>over that interval.</a:t>
             </a:r>
             <a:endParaRPr lang="en-US" dirty="0"/>
           </a:p>
@@ -5768,7 +5830,7 @@
         <p:spPr>
           <a:xfrm>
             <a:off x="6790895" y="1565564"/>
-            <a:ext cx="4306596" cy="1200329"/>
+            <a:ext cx="4306596" cy="1477328"/>
           </a:xfrm>
           <a:prstGeom prst="rect">
             <a:avLst/>
@@ -5787,7 +5849,19 @@
             </a:pPr>
             <a:r>
               <a:rPr lang="en-US" dirty="0" smtClean="0"/>
-              <a:t>We use separate y-axis for crime and review lines, the scaling of both y –axis will change based on the min and max value of crime and review value.</a:t>
+              <a:t>We use separate y-axis for crime and review lines, the scaling of both y –</a:t>
+            </a:r>
+            <a:r>
+              <a:rPr lang="en-US" dirty="0" smtClean="0"/>
+              <a:t>axis </a:t>
+            </a:r>
+            <a:r>
+              <a:rPr lang="en-US" dirty="0" smtClean="0"/>
+              <a:t>will change based on the min and max value of </a:t>
+            </a:r>
+            <a:r>
+              <a:rPr lang="en-US" dirty="0" smtClean="0"/>
+              <a:t>selected sample points within the time range.</a:t>
             </a:r>
             <a:endParaRPr lang="en-US" dirty="0"/>
           </a:p>
@@ -6164,11 +6238,7 @@
             </a:r>
             <a:r>
               <a:rPr lang="en-US" dirty="0" smtClean="0"/>
-              <a:t>and </a:t>
-            </a:r>
-            <a:r>
-              <a:rPr lang="en-US" dirty="0" smtClean="0"/>
-              <a:t>business  </a:t>
+              <a:t>and business  </a:t>
             </a:r>
             <a:r>
               <a:rPr lang="en-US" dirty="0"/>
@@ -7352,11 +7422,7 @@
           <a:p>
             <a:r>
               <a:rPr lang="en-US" dirty="0" smtClean="0"/>
-              <a:t>Mosaic </a:t>
-            </a:r>
-            <a:r>
-              <a:rPr lang="en-US" dirty="0" smtClean="0"/>
-              <a:t>Plot</a:t>
+              <a:t>Mosaic Plot</a:t>
             </a:r>
             <a:endParaRPr lang="en-US" dirty="0"/>
           </a:p>
@@ -8094,14 +8160,10 @@
           <a:p>
             <a:r>
               <a:rPr lang="en-US" dirty="0"/>
-              <a:t>Time range selected for the purpose of visualization is </a:t>
-            </a:r>
-            <a:r>
-              <a:rPr lang="en-US"/>
-              <a:t>from </a:t>
-            </a:r>
-            <a:r>
-              <a:rPr lang="en-US" b="1" smtClean="0"/>
+              <a:t>Time range selected for the purpose of visualization is from </a:t>
+            </a:r>
+            <a:r>
+              <a:rPr lang="en-US" b="1" dirty="0" smtClean="0"/>
               <a:t>January </a:t>
             </a:r>
             <a:r>
@@ -11437,7 +11499,7 @@
   <a:extraClrSchemeLst/>
   <a:extLst>
     <a:ext uri="{05A4C25C-085E-4340-85A3-A5531E510DB2}">
-      <thm15:themeFamily xmlns:thm15="http://schemas.microsoft.com/office/thememl/2012/main" xmlns="" name="Office Theme" id="{62F939B6-93AF-4DB8-9C6B-D6C7DFDC589F}" vid="{4A3C46E8-61CC-4603-A589-7422A47A8E4A}"/>
+      <thm15:themeFamily xmlns:thm15="http://schemas.microsoft.com/office/thememl/2012/main" name="Office Theme" id="{62F939B6-93AF-4DB8-9C6B-D6C7DFDC589F}" vid="{4A3C46E8-61CC-4603-A589-7422A47A8E4A}"/>
     </a:ext>
   </a:extLst>
 </a:theme>

</xml_diff>